<commit_message>
minor updates to code and .ppt
</commit_message>
<xml_diff>
--- a/tidyverse.pptx
+++ b/tidyverse.pptx
@@ -5,7 +5,7 @@
     <p:sldMasterId id="2147483648" r:id="rId1"/>
   </p:sldMasterIdLst>
   <p:notesMasterIdLst>
-    <p:notesMasterId r:id="rId25"/>
+    <p:notesMasterId r:id="rId27"/>
   </p:notesMasterIdLst>
   <p:sldIdLst>
     <p:sldId id="256" r:id="rId2"/>
@@ -21,16 +21,18 @@
     <p:sldId id="271" r:id="rId12"/>
     <p:sldId id="272" r:id="rId13"/>
     <p:sldId id="265" r:id="rId14"/>
-    <p:sldId id="276" r:id="rId15"/>
-    <p:sldId id="273" r:id="rId16"/>
-    <p:sldId id="275" r:id="rId17"/>
-    <p:sldId id="277" r:id="rId18"/>
-    <p:sldId id="264" r:id="rId19"/>
-    <p:sldId id="279" r:id="rId20"/>
-    <p:sldId id="268" r:id="rId21"/>
-    <p:sldId id="282" r:id="rId22"/>
-    <p:sldId id="281" r:id="rId23"/>
-    <p:sldId id="261" r:id="rId24"/>
+    <p:sldId id="283" r:id="rId15"/>
+    <p:sldId id="284" r:id="rId16"/>
+    <p:sldId id="276" r:id="rId17"/>
+    <p:sldId id="273" r:id="rId18"/>
+    <p:sldId id="275" r:id="rId19"/>
+    <p:sldId id="277" r:id="rId20"/>
+    <p:sldId id="264" r:id="rId21"/>
+    <p:sldId id="279" r:id="rId22"/>
+    <p:sldId id="268" r:id="rId23"/>
+    <p:sldId id="282" r:id="rId24"/>
+    <p:sldId id="281" r:id="rId25"/>
+    <p:sldId id="261" r:id="rId26"/>
   </p:sldIdLst>
   <p:sldSz cx="12192000" cy="6858000"/>
   <p:notesSz cx="6858000" cy="9144000"/>
@@ -131,7 +133,7 @@
   </p:defaultTextStyle>
   <p:extLst>
     <p:ext uri="{EFAFB233-063F-42B5-8137-9DF3F51BA10A}">
-      <p15:sldGuideLst xmlns:p15="http://schemas.microsoft.com/office/powerpoint/2012/main" xmlns="">
+      <p15:sldGuideLst xmlns:p15="http://schemas.microsoft.com/office/powerpoint/2012/main">
         <p15:guide id="1" orient="horz" pos="2160">
           <p15:clr>
             <a:srgbClr val="A4A3A4"/>
@@ -230,7 +232,7 @@
           <a:p>
             <a:fld id="{79BE55A1-585B-DB44-AA6C-66287C413553}" type="datetimeFigureOut">
               <a:rPr lang="en-US" smtClean="0"/>
-              <a:t>1/23/19</a:t>
+              <a:t>1/24/2019</a:t>
             </a:fld>
             <a:endParaRPr lang="en-US"/>
           </a:p>
@@ -646,83 +648,11 @@
           <a:bodyPr/>
           <a:lstStyle/>
           <a:p>
-            <a:pPr marL="0" marR="0" indent="0" algn="l" defTabSz="457200" rtl="0" eaLnBrk="1" fontAlgn="auto" latinLnBrk="0" hangingPunct="1">
-              <a:lnSpc>
-                <a:spcPct val="100000"/>
-              </a:lnSpc>
-              <a:spcBef>
-                <a:spcPts val="0"/>
-              </a:spcBef>
-              <a:spcAft>
-                <a:spcPts val="0"/>
-              </a:spcAft>
-              <a:buClrTx/>
-              <a:buSzTx/>
-              <a:buFontTx/>
-              <a:buNone/>
-              <a:tabLst/>
-              <a:defRPr/>
-            </a:pPr>
-            <a:r>
-              <a:rPr lang="en-CA" dirty="0" err="1" smtClean="0"/>
-              <a:t>tidyr</a:t>
-            </a:r>
-            <a:r>
-              <a:rPr lang="en-CA" dirty="0" smtClean="0"/>
-              <a:t> goal: to make data cleaning as painless and effective as possible</a:t>
-            </a:r>
-          </a:p>
-          <a:p>
-            <a:pPr marL="0" marR="0" indent="0" algn="l" defTabSz="457200" rtl="0" eaLnBrk="1" fontAlgn="auto" latinLnBrk="0" hangingPunct="1">
-              <a:lnSpc>
-                <a:spcPct val="100000"/>
-              </a:lnSpc>
-              <a:spcBef>
-                <a:spcPts val="0"/>
-              </a:spcBef>
-              <a:spcAft>
-                <a:spcPts val="0"/>
-              </a:spcAft>
-              <a:buClrTx/>
-              <a:buSzTx/>
-              <a:buFontTx/>
-              <a:buNone/>
-              <a:tabLst/>
-              <a:defRPr/>
-            </a:pPr>
-            <a:r>
-              <a:rPr lang="en-CA" dirty="0" smtClean="0"/>
-              <a:t>https://</a:t>
-            </a:r>
-            <a:r>
-              <a:rPr lang="en-CA" dirty="0" err="1" smtClean="0"/>
-              <a:t>github.com</a:t>
-            </a:r>
-            <a:r>
-              <a:rPr lang="en-CA" dirty="0" smtClean="0"/>
-              <a:t>/</a:t>
-            </a:r>
-            <a:r>
-              <a:rPr lang="en-CA" dirty="0" err="1" smtClean="0"/>
-              <a:t>rstudio</a:t>
-            </a:r>
-            <a:r>
-              <a:rPr lang="en-CA" dirty="0" smtClean="0"/>
-              <a:t>/</a:t>
-            </a:r>
-            <a:r>
-              <a:rPr lang="en-CA" dirty="0" err="1" smtClean="0"/>
-              <a:t>cheatsheets</a:t>
-            </a:r>
-            <a:r>
-              <a:rPr lang="en-CA" dirty="0" smtClean="0"/>
-              <a:t>/blob/master/data-</a:t>
-            </a:r>
-            <a:r>
-              <a:rPr lang="en-CA" dirty="0" err="1" smtClean="0"/>
-              <a:t>import.pdf</a:t>
-            </a:r>
-            <a:endParaRPr lang="en-CA" dirty="0" smtClean="0"/>
+            <a:r>
+              <a:rPr lang="en-CA" dirty="0" smtClean="0"/>
+              <a:t>Variables are in rows and columns!</a:t>
+            </a:r>
+            <a:endParaRPr lang="en-CA" dirty="0"/>
           </a:p>
         </p:txBody>
       </p:sp>
@@ -743,7 +673,7 @@
           <a:p>
             <a:fld id="{F0DF66E8-9777-DD40-AF28-F574EDC2F055}" type="slidenum">
               <a:rPr lang="en-US" smtClean="0"/>
-              <a:t>14</a:t>
+              <a:t>13</a:t>
             </a:fld>
             <a:endParaRPr lang="en-US"/>
           </a:p>
@@ -752,7 +682,7 @@
     </p:spTree>
     <p:extLst>
       <p:ext uri="{BB962C8B-B14F-4D97-AF65-F5344CB8AC3E}">
-        <p14:creationId xmlns:p14="http://schemas.microsoft.com/office/powerpoint/2010/main" val="1233599517"/>
+        <p14:creationId xmlns:p14="http://schemas.microsoft.com/office/powerpoint/2010/main" val="1800088933"/>
       </p:ext>
     </p:extLst>
   </p:cSld>
@@ -903,7 +833,7 @@
           <a:p>
             <a:fld id="{F0DF66E8-9777-DD40-AF28-F574EDC2F055}" type="slidenum">
               <a:rPr lang="en-US" smtClean="0"/>
-              <a:t>15</a:t>
+              <a:t>16</a:t>
             </a:fld>
             <a:endParaRPr lang="en-US"/>
           </a:p>
@@ -983,15 +913,89 @@
               <a:tabLst/>
               <a:defRPr/>
             </a:pPr>
-            <a:r>
-              <a:rPr lang="en-CA" dirty="0" err="1" smtClean="0"/>
-              <a:t>tidyr</a:t>
-            </a:r>
-            <a:r>
-              <a:rPr lang="en-CA" dirty="0" smtClean="0"/>
-              <a:t> goal: to make data cleaning as painless and effective as possible</a:t>
-            </a:r>
-          </a:p>
+            <a:endParaRPr lang="en-CA" dirty="0" smtClean="0"/>
+          </a:p>
+        </p:txBody>
+      </p:sp>
+      <p:sp>
+        <p:nvSpPr>
+          <p:cNvPr id="4" name="Slide Number Placeholder 3"/>
+          <p:cNvSpPr>
+            <a:spLocks noGrp="1"/>
+          </p:cNvSpPr>
+          <p:nvPr>
+            <p:ph type="sldNum" sz="quarter" idx="10"/>
+          </p:nvPr>
+        </p:nvSpPr>
+        <p:spPr/>
+        <p:txBody>
+          <a:bodyPr/>
+          <a:lstStyle/>
+          <a:p>
+            <a:fld id="{F0DF66E8-9777-DD40-AF28-F574EDC2F055}" type="slidenum">
+              <a:rPr lang="en-US" smtClean="0"/>
+              <a:t>17</a:t>
+            </a:fld>
+            <a:endParaRPr lang="en-US"/>
+          </a:p>
+        </p:txBody>
+      </p:sp>
+    </p:spTree>
+    <p:extLst>
+      <p:ext uri="{BB962C8B-B14F-4D97-AF65-F5344CB8AC3E}">
+        <p14:creationId xmlns:p14="http://schemas.microsoft.com/office/powerpoint/2010/main" val="1233599517"/>
+      </p:ext>
+    </p:extLst>
+  </p:cSld>
+  <p:clrMapOvr>
+    <a:masterClrMapping/>
+  </p:clrMapOvr>
+</p:notes>
+</file>
+
+<file path=ppt/notesSlides/notesSlide5.xml><?xml version="1.0" encoding="utf-8"?>
+<p:notes xmlns:a="http://schemas.openxmlformats.org/drawingml/2006/main" xmlns:r="http://schemas.openxmlformats.org/officeDocument/2006/relationships" xmlns:p="http://schemas.openxmlformats.org/presentationml/2006/main">
+  <p:cSld>
+    <p:spTree>
+      <p:nvGrpSpPr>
+        <p:cNvPr id="1" name=""/>
+        <p:cNvGrpSpPr/>
+        <p:nvPr/>
+      </p:nvGrpSpPr>
+      <p:grpSpPr>
+        <a:xfrm>
+          <a:off x="0" y="0"/>
+          <a:ext cx="0" cy="0"/>
+          <a:chOff x="0" y="0"/>
+          <a:chExt cx="0" cy="0"/>
+        </a:xfrm>
+      </p:grpSpPr>
+      <p:sp>
+        <p:nvSpPr>
+          <p:cNvPr id="2" name="Slide Image Placeholder 1"/>
+          <p:cNvSpPr>
+            <a:spLocks noGrp="1" noRot="1" noChangeAspect="1"/>
+          </p:cNvSpPr>
+          <p:nvPr>
+            <p:ph type="sldImg"/>
+          </p:nvPr>
+        </p:nvSpPr>
+        <p:spPr/>
+      </p:sp>
+      <p:sp>
+        <p:nvSpPr>
+          <p:cNvPr id="3" name="Notes Placeholder 2"/>
+          <p:cNvSpPr>
+            <a:spLocks noGrp="1"/>
+          </p:cNvSpPr>
+          <p:nvPr>
+            <p:ph type="body" idx="1"/>
+          </p:nvPr>
+        </p:nvSpPr>
+        <p:spPr/>
+        <p:txBody>
+          <a:bodyPr/>
+          <a:lstStyle/>
           <a:p>
             <a:pPr marL="0" marR="0" indent="0" algn="l" defTabSz="457200" rtl="0" eaLnBrk="1" fontAlgn="auto" latinLnBrk="0" hangingPunct="1">
               <a:lnSpc>
@@ -1010,38 +1014,6 @@
               <a:tabLst/>
               <a:defRPr/>
             </a:pPr>
-            <a:r>
-              <a:rPr lang="en-CA" dirty="0" smtClean="0"/>
-              <a:t>https://</a:t>
-            </a:r>
-            <a:r>
-              <a:rPr lang="en-CA" dirty="0" err="1" smtClean="0"/>
-              <a:t>github.com</a:t>
-            </a:r>
-            <a:r>
-              <a:rPr lang="en-CA" dirty="0" smtClean="0"/>
-              <a:t>/</a:t>
-            </a:r>
-            <a:r>
-              <a:rPr lang="en-CA" dirty="0" err="1" smtClean="0"/>
-              <a:t>rstudio</a:t>
-            </a:r>
-            <a:r>
-              <a:rPr lang="en-CA" dirty="0" smtClean="0"/>
-              <a:t>/</a:t>
-            </a:r>
-            <a:r>
-              <a:rPr lang="en-CA" dirty="0" err="1" smtClean="0"/>
-              <a:t>cheatsheets</a:t>
-            </a:r>
-            <a:r>
-              <a:rPr lang="en-CA" dirty="0" smtClean="0"/>
-              <a:t>/blob/master/data-</a:t>
-            </a:r>
-            <a:r>
-              <a:rPr lang="en-CA" dirty="0" err="1" smtClean="0"/>
-              <a:t>import.pdf</a:t>
-            </a:r>
             <a:endParaRPr lang="en-CA" dirty="0" smtClean="0"/>
           </a:p>
         </p:txBody>
@@ -1063,7 +1035,7 @@
           <a:p>
             <a:fld id="{F0DF66E8-9777-DD40-AF28-F574EDC2F055}" type="slidenum">
               <a:rPr lang="en-US" smtClean="0"/>
-              <a:t>16</a:t>
+              <a:t>18</a:t>
             </a:fld>
             <a:endParaRPr lang="en-US"/>
           </a:p>
@@ -1213,7 +1185,7 @@
           <a:p>
             <a:fld id="{B89BA1C6-EE3C-46F3-B8E0-7B6E404F59A3}" type="datetimeFigureOut">
               <a:rPr lang="en-CA" smtClean="0"/>
-              <a:t>1/23/19</a:t>
+              <a:t>24/01/2019</a:t>
             </a:fld>
             <a:endParaRPr lang="en-CA"/>
           </a:p>
@@ -1383,7 +1355,7 @@
           <a:p>
             <a:fld id="{B89BA1C6-EE3C-46F3-B8E0-7B6E404F59A3}" type="datetimeFigureOut">
               <a:rPr lang="en-CA" smtClean="0"/>
-              <a:t>1/23/19</a:t>
+              <a:t>24/01/2019</a:t>
             </a:fld>
             <a:endParaRPr lang="en-CA"/>
           </a:p>
@@ -1563,7 +1535,7 @@
           <a:p>
             <a:fld id="{B89BA1C6-EE3C-46F3-B8E0-7B6E404F59A3}" type="datetimeFigureOut">
               <a:rPr lang="en-CA" smtClean="0"/>
-              <a:t>1/23/19</a:t>
+              <a:t>24/01/2019</a:t>
             </a:fld>
             <a:endParaRPr lang="en-CA"/>
           </a:p>
@@ -1733,7 +1705,7 @@
           <a:p>
             <a:fld id="{B89BA1C6-EE3C-46F3-B8E0-7B6E404F59A3}" type="datetimeFigureOut">
               <a:rPr lang="en-CA" smtClean="0"/>
-              <a:t>1/23/19</a:t>
+              <a:t>24/01/2019</a:t>
             </a:fld>
             <a:endParaRPr lang="en-CA"/>
           </a:p>
@@ -1979,7 +1951,7 @@
           <a:p>
             <a:fld id="{B89BA1C6-EE3C-46F3-B8E0-7B6E404F59A3}" type="datetimeFigureOut">
               <a:rPr lang="en-CA" smtClean="0"/>
-              <a:t>1/23/19</a:t>
+              <a:t>24/01/2019</a:t>
             </a:fld>
             <a:endParaRPr lang="en-CA"/>
           </a:p>
@@ -2211,7 +2183,7 @@
           <a:p>
             <a:fld id="{B89BA1C6-EE3C-46F3-B8E0-7B6E404F59A3}" type="datetimeFigureOut">
               <a:rPr lang="en-CA" smtClean="0"/>
-              <a:t>1/23/19</a:t>
+              <a:t>24/01/2019</a:t>
             </a:fld>
             <a:endParaRPr lang="en-CA"/>
           </a:p>
@@ -2578,7 +2550,7 @@
           <a:p>
             <a:fld id="{B89BA1C6-EE3C-46F3-B8E0-7B6E404F59A3}" type="datetimeFigureOut">
               <a:rPr lang="en-CA" smtClean="0"/>
-              <a:t>1/23/19</a:t>
+              <a:t>24/01/2019</a:t>
             </a:fld>
             <a:endParaRPr lang="en-CA"/>
           </a:p>
@@ -2696,7 +2668,7 @@
           <a:p>
             <a:fld id="{B89BA1C6-EE3C-46F3-B8E0-7B6E404F59A3}" type="datetimeFigureOut">
               <a:rPr lang="en-CA" smtClean="0"/>
-              <a:t>1/23/19</a:t>
+              <a:t>24/01/2019</a:t>
             </a:fld>
             <a:endParaRPr lang="en-CA"/>
           </a:p>
@@ -2791,7 +2763,7 @@
           <a:p>
             <a:fld id="{B89BA1C6-EE3C-46F3-B8E0-7B6E404F59A3}" type="datetimeFigureOut">
               <a:rPr lang="en-CA" smtClean="0"/>
-              <a:t>1/23/19</a:t>
+              <a:t>24/01/2019</a:t>
             </a:fld>
             <a:endParaRPr lang="en-CA"/>
           </a:p>
@@ -3068,7 +3040,7 @@
           <a:p>
             <a:fld id="{B89BA1C6-EE3C-46F3-B8E0-7B6E404F59A3}" type="datetimeFigureOut">
               <a:rPr lang="en-CA" smtClean="0"/>
-              <a:t>1/23/19</a:t>
+              <a:t>24/01/2019</a:t>
             </a:fld>
             <a:endParaRPr lang="en-CA"/>
           </a:p>
@@ -3321,7 +3293,7 @@
           <a:p>
             <a:fld id="{B89BA1C6-EE3C-46F3-B8E0-7B6E404F59A3}" type="datetimeFigureOut">
               <a:rPr lang="en-CA" smtClean="0"/>
-              <a:t>1/23/19</a:t>
+              <a:t>24/01/2019</a:t>
             </a:fld>
             <a:endParaRPr lang="en-CA"/>
           </a:p>
@@ -3534,7 +3506,7 @@
           <a:p>
             <a:fld id="{B89BA1C6-EE3C-46F3-B8E0-7B6E404F59A3}" type="datetimeFigureOut">
               <a:rPr lang="en-CA" smtClean="0"/>
-              <a:t>1/23/19</a:t>
+              <a:t>24/01/2019</a:t>
             </a:fld>
             <a:endParaRPr lang="en-CA"/>
           </a:p>
@@ -4193,7 +4165,7 @@
           <a:effectLst/>
           <a:extLst>
             <a:ext uri="{91240B29-F687-4f45-9708-019B960494DF}">
-              <a14:hiddenLine xmlns:a14="http://schemas.microsoft.com/office/drawing/2010/main" w="9525">
+              <a14:hiddenLine xmlns:a14="http://schemas.microsoft.com/office/drawing/2010/main" xmlns="" w="9525">
                 <a:solidFill>
                   <a:schemeClr val="tx1"/>
                 </a:solidFill>
@@ -4203,7 +4175,7 @@
               </a14:hiddenLine>
             </a:ext>
             <a:ext uri="{AF507438-7753-43e0-B8FC-AC1667EBCBE1}">
-              <a14:hiddenEffects xmlns:a14="http://schemas.microsoft.com/office/drawing/2010/main">
+              <a14:hiddenEffects xmlns:a14="http://schemas.microsoft.com/office/drawing/2010/main" xmlns="">
                 <a:effectLst>
                   <a:outerShdw dist="35921" dir="2700000" algn="ctr" rotWithShape="0">
                     <a:schemeClr val="bg2"/>
@@ -4581,7 +4553,7 @@
           <a:effectLst/>
           <a:extLst>
             <a:ext uri="{91240B29-F687-4f45-9708-019B960494DF}">
-              <a14:hiddenLine xmlns:a14="http://schemas.microsoft.com/office/drawing/2010/main" w="9525">
+              <a14:hiddenLine xmlns:a14="http://schemas.microsoft.com/office/drawing/2010/main" xmlns="" w="9525">
                 <a:solidFill>
                   <a:schemeClr val="tx1"/>
                 </a:solidFill>
@@ -4591,7 +4563,7 @@
               </a14:hiddenLine>
             </a:ext>
             <a:ext uri="{AF507438-7753-43e0-B8FC-AC1667EBCBE1}">
-              <a14:hiddenEffects xmlns:a14="http://schemas.microsoft.com/office/drawing/2010/main">
+              <a14:hiddenEffects xmlns:a14="http://schemas.microsoft.com/office/drawing/2010/main" xmlns="">
                 <a:effectLst>
                   <a:outerShdw dist="35921" dir="2700000" algn="ctr" rotWithShape="0">
                     <a:schemeClr val="bg2"/>
@@ -4702,6 +4674,36 @@
           </a:prstGeom>
         </p:spPr>
       </p:pic>
+      <p:sp>
+        <p:nvSpPr>
+          <p:cNvPr id="8" name="TextBox 7"/>
+          <p:cNvSpPr txBox="1"/>
+          <p:nvPr/>
+        </p:nvSpPr>
+        <p:spPr>
+          <a:xfrm>
+            <a:off x="7945229" y="3106996"/>
+            <a:ext cx="3066897" cy="523220"/>
+          </a:xfrm>
+          <a:prstGeom prst="rect">
+            <a:avLst/>
+          </a:prstGeom>
+          <a:noFill/>
+        </p:spPr>
+        <p:txBody>
+          <a:bodyPr wrap="square" rtlCol="0">
+            <a:spAutoFit/>
+          </a:bodyPr>
+          <a:lstStyle/>
+          <a:p>
+            <a:r>
+              <a:rPr lang="en-CA" sz="2800" dirty="0" smtClean="0"/>
+              <a:t>Printing:</a:t>
+            </a:r>
+            <a:endParaRPr lang="en-CA" sz="2800" dirty="0"/>
+          </a:p>
+        </p:txBody>
+      </p:sp>
     </p:spTree>
     <p:extLst>
       <p:ext uri="{BB962C8B-B14F-4D97-AF65-F5344CB8AC3E}">
@@ -4993,7 +4995,7 @@
           <a:effectLst/>
           <a:extLst>
             <a:ext uri="{91240B29-F687-4f45-9708-019B960494DF}">
-              <a14:hiddenLine xmlns:a14="http://schemas.microsoft.com/office/drawing/2010/main" w="9525">
+              <a14:hiddenLine xmlns:a14="http://schemas.microsoft.com/office/drawing/2010/main" xmlns="" w="9525">
                 <a:solidFill>
                   <a:schemeClr val="tx1"/>
                 </a:solidFill>
@@ -5003,7 +5005,7 @@
               </a14:hiddenLine>
             </a:ext>
             <a:ext uri="{AF507438-7753-43e0-B8FC-AC1667EBCBE1}">
-              <a14:hiddenEffects xmlns:a14="http://schemas.microsoft.com/office/drawing/2010/main">
+              <a14:hiddenEffects xmlns:a14="http://schemas.microsoft.com/office/drawing/2010/main" xmlns="">
                 <a:effectLst>
                   <a:outerShdw dist="35921" dir="2700000" algn="ctr" rotWithShape="0">
                     <a:schemeClr val="bg2"/>
@@ -5182,6 +5184,48 @@
           </a:prstGeom>
         </p:spPr>
       </p:pic>
+      <p:sp>
+        <p:nvSpPr>
+          <p:cNvPr id="7" name="TextBox 6"/>
+          <p:cNvSpPr txBox="1"/>
+          <p:nvPr/>
+        </p:nvSpPr>
+        <p:spPr>
+          <a:xfrm>
+            <a:off x="7945229" y="3106996"/>
+            <a:ext cx="3066897" cy="523220"/>
+          </a:xfrm>
+          <a:prstGeom prst="rect">
+            <a:avLst/>
+          </a:prstGeom>
+          <a:noFill/>
+        </p:spPr>
+        <p:txBody>
+          <a:bodyPr wrap="square" rtlCol="0">
+            <a:spAutoFit/>
+          </a:bodyPr>
+          <a:lstStyle/>
+          <a:p>
+            <a:r>
+              <a:rPr lang="en-CA" sz="2800" dirty="0" smtClean="0">
+                <a:solidFill>
+                  <a:schemeClr val="bg1">
+                    <a:lumMod val="65000"/>
+                  </a:schemeClr>
+                </a:solidFill>
+              </a:rPr>
+              <a:t>Printing:</a:t>
+            </a:r>
+            <a:endParaRPr lang="en-CA" sz="2800" dirty="0">
+              <a:solidFill>
+                <a:schemeClr val="bg1">
+                  <a:lumMod val="65000"/>
+                </a:schemeClr>
+              </a:solidFill>
+            </a:endParaRPr>
+          </a:p>
+        </p:txBody>
+      </p:sp>
     </p:spTree>
     <p:extLst>
       <p:ext uri="{BB962C8B-B14F-4D97-AF65-F5344CB8AC3E}">
@@ -5283,28 +5327,22 @@
       </p:sp>
       <p:pic>
         <p:nvPicPr>
-          <p:cNvPr id="9" name="Picture 8" descr="Screen Shot 2019-01-15 at 9.38.36 AM.png"/>
+          <p:cNvPr id="6" name="Picture 5"/>
           <p:cNvPicPr>
             <a:picLocks noChangeAspect="1"/>
           </p:cNvPicPr>
           <p:nvPr/>
         </p:nvPicPr>
         <p:blipFill>
-          <a:blip r:embed="rId2">
-            <a:extLst>
-              <a:ext uri="{28A0092B-C50C-407E-A947-70E740481C1C}">
-                <a14:useLocalDpi xmlns:a14="http://schemas.microsoft.com/office/drawing/2010/main" val="0"/>
-              </a:ext>
-            </a:extLst>
-          </a:blip>
+          <a:blip r:embed="rId3"/>
           <a:stretch>
             <a:fillRect/>
           </a:stretch>
         </p:blipFill>
         <p:spPr>
           <a:xfrm>
-            <a:off x="510888" y="3092015"/>
-            <a:ext cx="11268751" cy="3574914"/>
+            <a:off x="1574698" y="3187034"/>
+            <a:ext cx="9465280" cy="3518566"/>
           </a:xfrm>
           <a:prstGeom prst="rect">
             <a:avLst/>
@@ -5357,6 +5395,309 @@
           <a:lstStyle/>
           <a:p>
             <a:r>
+              <a:rPr lang="en-CA" dirty="0" smtClean="0"/>
+              <a:t>What is tidy data?</a:t>
+            </a:r>
+            <a:endParaRPr lang="en-CA" dirty="0"/>
+          </a:p>
+        </p:txBody>
+      </p:sp>
+      <p:sp>
+        <p:nvSpPr>
+          <p:cNvPr id="3" name="Content Placeholder 2"/>
+          <p:cNvSpPr>
+            <a:spLocks noGrp="1"/>
+          </p:cNvSpPr>
+          <p:nvPr>
+            <p:ph idx="1"/>
+          </p:nvPr>
+        </p:nvSpPr>
+        <p:spPr>
+          <a:xfrm>
+            <a:off x="838200" y="1548244"/>
+            <a:ext cx="10515600" cy="4351338"/>
+          </a:xfrm>
+        </p:spPr>
+        <p:txBody>
+          <a:bodyPr/>
+          <a:lstStyle/>
+          <a:p>
+            <a:r>
+              <a:rPr lang="en-CA" dirty="0" smtClean="0"/>
+              <a:t>Each </a:t>
+            </a:r>
+            <a:r>
+              <a:rPr lang="en-CA" dirty="0"/>
+              <a:t>variable is in a column.</a:t>
+            </a:r>
+          </a:p>
+          <a:p>
+            <a:r>
+              <a:rPr lang="en-CA" dirty="0"/>
+              <a:t>Each observation is a row.</a:t>
+            </a:r>
+          </a:p>
+          <a:p>
+            <a:r>
+              <a:rPr lang="en-CA" dirty="0"/>
+              <a:t>Each value is a cell.</a:t>
+            </a:r>
+          </a:p>
+          <a:p>
+            <a:endParaRPr lang="en-CA" dirty="0"/>
+          </a:p>
+        </p:txBody>
+      </p:sp>
+      <p:pic>
+        <p:nvPicPr>
+          <p:cNvPr id="9" name="Picture 8" descr="Screen Shot 2019-01-15 at 9.38.36 AM.png"/>
+          <p:cNvPicPr>
+            <a:picLocks noChangeAspect="1"/>
+          </p:cNvPicPr>
+          <p:nvPr/>
+        </p:nvPicPr>
+        <p:blipFill>
+          <a:blip r:embed="rId2">
+            <a:extLst>
+              <a:ext uri="{28A0092B-C50C-407E-A947-70E740481C1C}">
+                <a14:useLocalDpi xmlns:a14="http://schemas.microsoft.com/office/drawing/2010/main" val="0"/>
+              </a:ext>
+            </a:extLst>
+          </a:blip>
+          <a:stretch>
+            <a:fillRect/>
+          </a:stretch>
+        </p:blipFill>
+        <p:spPr>
+          <a:xfrm>
+            <a:off x="510888" y="3092015"/>
+            <a:ext cx="11268751" cy="3574914"/>
+          </a:xfrm>
+          <a:prstGeom prst="rect">
+            <a:avLst/>
+          </a:prstGeom>
+        </p:spPr>
+      </p:pic>
+    </p:spTree>
+    <p:extLst>
+      <p:ext uri="{BB962C8B-B14F-4D97-AF65-F5344CB8AC3E}">
+        <p14:creationId xmlns:p14="http://schemas.microsoft.com/office/powerpoint/2010/main" val="2951639104"/>
+      </p:ext>
+    </p:extLst>
+  </p:cSld>
+  <p:clrMapOvr>
+    <a:masterClrMapping/>
+  </p:clrMapOvr>
+</p:sld>
+</file>
+
+<file path=ppt/slides/slide15.xml><?xml version="1.0" encoding="utf-8"?>
+<p:sld xmlns:a="http://schemas.openxmlformats.org/drawingml/2006/main" xmlns:r="http://schemas.openxmlformats.org/officeDocument/2006/relationships" xmlns:p="http://schemas.openxmlformats.org/presentationml/2006/main">
+  <p:cSld>
+    <p:spTree>
+      <p:nvGrpSpPr>
+        <p:cNvPr id="1" name=""/>
+        <p:cNvGrpSpPr/>
+        <p:nvPr/>
+      </p:nvGrpSpPr>
+      <p:grpSpPr>
+        <a:xfrm>
+          <a:off x="0" y="0"/>
+          <a:ext cx="0" cy="0"/>
+          <a:chOff x="0" y="0"/>
+          <a:chExt cx="0" cy="0"/>
+        </a:xfrm>
+      </p:grpSpPr>
+      <p:sp>
+        <p:nvSpPr>
+          <p:cNvPr id="2" name="Title 1"/>
+          <p:cNvSpPr>
+            <a:spLocks noGrp="1"/>
+          </p:cNvSpPr>
+          <p:nvPr>
+            <p:ph type="title"/>
+          </p:nvPr>
+        </p:nvSpPr>
+        <p:spPr/>
+        <p:txBody>
+          <a:bodyPr/>
+          <a:lstStyle/>
+          <a:p>
+            <a:r>
+              <a:rPr lang="en-CA" dirty="0" smtClean="0"/>
+              <a:t>Typical </a:t>
+            </a:r>
+            <a:r>
+              <a:rPr lang="en-CA" dirty="0" err="1" smtClean="0"/>
+              <a:t>tidyverse</a:t>
+            </a:r>
+            <a:r>
+              <a:rPr lang="en-CA" dirty="0" smtClean="0"/>
+              <a:t> grammar</a:t>
+            </a:r>
+            <a:endParaRPr lang="en-CA" dirty="0"/>
+          </a:p>
+        </p:txBody>
+      </p:sp>
+      <p:sp>
+        <p:nvSpPr>
+          <p:cNvPr id="3" name="Content Placeholder 2"/>
+          <p:cNvSpPr>
+            <a:spLocks noGrp="1"/>
+          </p:cNvSpPr>
+          <p:nvPr>
+            <p:ph idx="1"/>
+          </p:nvPr>
+        </p:nvSpPr>
+        <p:spPr>
+          <a:xfrm>
+            <a:off x="838200" y="2336903"/>
+            <a:ext cx="10515600" cy="4351338"/>
+          </a:xfrm>
+        </p:spPr>
+        <p:txBody>
+          <a:bodyPr/>
+          <a:lstStyle/>
+          <a:p>
+            <a:pPr marL="0" indent="0">
+              <a:buNone/>
+            </a:pPr>
+            <a:r>
+              <a:rPr lang="en-CA" dirty="0" smtClean="0"/>
+              <a:t>result &lt;- </a:t>
+            </a:r>
+            <a:r>
+              <a:rPr lang="en-CA" dirty="0" err="1" smtClean="0"/>
+              <a:t>functionName</a:t>
+            </a:r>
+            <a:r>
+              <a:rPr lang="en-CA" dirty="0" smtClean="0"/>
+              <a:t>(</a:t>
+            </a:r>
+            <a:r>
+              <a:rPr lang="en-CA" dirty="0" err="1" smtClean="0"/>
+              <a:t>dataframe</a:t>
+            </a:r>
+            <a:r>
+              <a:rPr lang="en-CA" dirty="0" smtClean="0"/>
+              <a:t>, vector, vector, specifications)</a:t>
+            </a:r>
+            <a:br>
+              <a:rPr lang="en-CA" dirty="0" smtClean="0"/>
+            </a:br>
+            <a:r>
+              <a:rPr lang="en-CA" dirty="0" smtClean="0"/>
+              <a:t/>
+            </a:r>
+            <a:br>
+              <a:rPr lang="en-CA" dirty="0" smtClean="0"/>
+            </a:br>
+            <a:r>
+              <a:rPr lang="en-CA" dirty="0" smtClean="0"/>
+              <a:t>OR</a:t>
+            </a:r>
+            <a:br>
+              <a:rPr lang="en-CA" dirty="0" smtClean="0"/>
+            </a:br>
+            <a:r>
+              <a:rPr lang="en-CA" dirty="0" smtClean="0"/>
+              <a:t/>
+            </a:r>
+            <a:br>
+              <a:rPr lang="en-CA" dirty="0" smtClean="0"/>
+            </a:br>
+            <a:r>
+              <a:rPr lang="en-CA" dirty="0" smtClean="0"/>
+              <a:t>result &lt;- </a:t>
+            </a:r>
+            <a:r>
+              <a:rPr lang="en-CA" dirty="0" err="1" smtClean="0"/>
+              <a:t>dataframe</a:t>
+            </a:r>
+            <a:r>
+              <a:rPr lang="en-CA" dirty="0" smtClean="0"/>
+              <a:t> %&gt;%</a:t>
+            </a:r>
+            <a:br>
+              <a:rPr lang="en-CA" dirty="0" smtClean="0"/>
+            </a:br>
+            <a:r>
+              <a:rPr lang="en-CA" dirty="0" smtClean="0"/>
+              <a:t>		</a:t>
+            </a:r>
+            <a:r>
+              <a:rPr lang="en-CA" dirty="0" err="1" smtClean="0"/>
+              <a:t>functionName</a:t>
+            </a:r>
+            <a:r>
+              <a:rPr lang="en-CA" dirty="0" smtClean="0"/>
+              <a:t>(vector, vector, specs) %&gt;%</a:t>
+            </a:r>
+            <a:br>
+              <a:rPr lang="en-CA" dirty="0" smtClean="0"/>
+            </a:br>
+            <a:r>
+              <a:rPr lang="en-CA" dirty="0" smtClean="0"/>
+              <a:t>		</a:t>
+            </a:r>
+            <a:r>
+              <a:rPr lang="en-CA" dirty="0" err="1" smtClean="0"/>
+              <a:t>anotherfunctionName</a:t>
+            </a:r>
+            <a:r>
+              <a:rPr lang="en-CA" dirty="0" smtClean="0"/>
+              <a:t>(vector, specs)</a:t>
+            </a:r>
+            <a:endParaRPr lang="en-CA" dirty="0"/>
+          </a:p>
+        </p:txBody>
+      </p:sp>
+    </p:spTree>
+    <p:extLst>
+      <p:ext uri="{BB962C8B-B14F-4D97-AF65-F5344CB8AC3E}">
+        <p14:creationId xmlns:p14="http://schemas.microsoft.com/office/powerpoint/2010/main" val="3308821288"/>
+      </p:ext>
+    </p:extLst>
+  </p:cSld>
+  <p:clrMapOvr>
+    <a:masterClrMapping/>
+  </p:clrMapOvr>
+</p:sld>
+</file>
+
+<file path=ppt/slides/slide16.xml><?xml version="1.0" encoding="utf-8"?>
+<p:sld xmlns:a="http://schemas.openxmlformats.org/drawingml/2006/main" xmlns:r="http://schemas.openxmlformats.org/officeDocument/2006/relationships" xmlns:p="http://schemas.openxmlformats.org/presentationml/2006/main">
+  <p:cSld>
+    <p:spTree>
+      <p:nvGrpSpPr>
+        <p:cNvPr id="1" name=""/>
+        <p:cNvGrpSpPr/>
+        <p:nvPr/>
+      </p:nvGrpSpPr>
+      <p:grpSpPr>
+        <a:xfrm>
+          <a:off x="0" y="0"/>
+          <a:ext cx="0" cy="0"/>
+          <a:chOff x="0" y="0"/>
+          <a:chExt cx="0" cy="0"/>
+        </a:xfrm>
+      </p:grpSpPr>
+      <p:sp>
+        <p:nvSpPr>
+          <p:cNvPr id="2" name="Title 1"/>
+          <p:cNvSpPr>
+            <a:spLocks noGrp="1"/>
+          </p:cNvSpPr>
+          <p:nvPr>
+            <p:ph type="title"/>
+          </p:nvPr>
+        </p:nvSpPr>
+        <p:spPr/>
+        <p:txBody>
+          <a:bodyPr/>
+          <a:lstStyle/>
+          <a:p>
+            <a:r>
               <a:rPr lang="en-CA" dirty="0" err="1"/>
               <a:t>t</a:t>
             </a:r>
@@ -5495,7 +5836,7 @@
 </p:sld>
 </file>
 
-<file path=ppt/slides/slide15.xml><?xml version="1.0" encoding="utf-8"?>
+<file path=ppt/slides/slide17.xml><?xml version="1.0" encoding="utf-8"?>
 <p:sld xmlns:a="http://schemas.openxmlformats.org/drawingml/2006/main" xmlns:r="http://schemas.openxmlformats.org/officeDocument/2006/relationships" xmlns:p="http://schemas.openxmlformats.org/presentationml/2006/main">
   <p:cSld>
     <p:spTree>
@@ -5930,7 +6271,7 @@
 </p:sld>
 </file>
 
-<file path=ppt/slides/slide16.xml><?xml version="1.0" encoding="utf-8"?>
+<file path=ppt/slides/slide18.xml><?xml version="1.0" encoding="utf-8"?>
 <p:sld xmlns:a="http://schemas.openxmlformats.org/drawingml/2006/main" xmlns:r="http://schemas.openxmlformats.org/officeDocument/2006/relationships" xmlns:p="http://schemas.openxmlformats.org/presentationml/2006/main">
   <p:cSld>
     <p:spTree>
@@ -6114,7 +6455,7 @@
 </p:sld>
 </file>
 
-<file path=ppt/slides/slide17.xml><?xml version="1.0" encoding="utf-8"?>
+<file path=ppt/slides/slide19.xml><?xml version="1.0" encoding="utf-8"?>
 <p:sld xmlns:a="http://schemas.openxmlformats.org/drawingml/2006/main" xmlns:r="http://schemas.openxmlformats.org/officeDocument/2006/relationships" xmlns:p="http://schemas.openxmlformats.org/presentationml/2006/main">
   <p:cSld>
     <p:spTree>
@@ -6228,7 +6569,11 @@
             </a:pPr>
             <a:r>
               <a:rPr lang="en-CA" dirty="0" smtClean="0"/>
-              <a:t>Condense multiple values into a single value: </a:t>
+              <a:t>Collapse </a:t>
+            </a:r>
+            <a:r>
+              <a:rPr lang="en-CA" dirty="0" smtClean="0"/>
+              <a:t>multiple values into a single value: </a:t>
             </a:r>
             <a:br>
               <a:rPr lang="en-CA" dirty="0" smtClean="0"/>
@@ -6282,7 +6627,68 @@
 </p:sld>
 </file>
 
-<file path=ppt/slides/slide18.xml><?xml version="1.0" encoding="utf-8"?>
+<file path=ppt/slides/slide2.xml><?xml version="1.0" encoding="utf-8"?>
+<p:sld xmlns:a="http://schemas.openxmlformats.org/drawingml/2006/main" xmlns:r="http://schemas.openxmlformats.org/officeDocument/2006/relationships" xmlns:p="http://schemas.openxmlformats.org/presentationml/2006/main">
+  <p:cSld>
+    <p:spTree>
+      <p:nvGrpSpPr>
+        <p:cNvPr id="1" name=""/>
+        <p:cNvGrpSpPr/>
+        <p:nvPr/>
+      </p:nvGrpSpPr>
+      <p:grpSpPr>
+        <a:xfrm>
+          <a:off x="0" y="0"/>
+          <a:ext cx="0" cy="0"/>
+          <a:chOff x="0" y="0"/>
+          <a:chExt cx="0" cy="0"/>
+        </a:xfrm>
+      </p:grpSpPr>
+      <p:sp>
+        <p:nvSpPr>
+          <p:cNvPr id="5" name="Title 4"/>
+          <p:cNvSpPr>
+            <a:spLocks noGrp="1"/>
+          </p:cNvSpPr>
+          <p:nvPr>
+            <p:ph type="title"/>
+          </p:nvPr>
+        </p:nvSpPr>
+        <p:spPr>
+          <a:xfrm>
+            <a:off x="838200" y="2615266"/>
+            <a:ext cx="10515600" cy="1325563"/>
+          </a:xfrm>
+        </p:spPr>
+        <p:txBody>
+          <a:bodyPr>
+            <a:normAutofit/>
+          </a:bodyPr>
+          <a:lstStyle/>
+          <a:p>
+            <a:pPr algn="ctr"/>
+            <a:r>
+              <a:rPr lang="en-CA" sz="4000" dirty="0" smtClean="0"/>
+              <a:t>There are many ways to do any given task in R.</a:t>
+            </a:r>
+            <a:endParaRPr lang="en-CA" sz="4000" dirty="0"/>
+          </a:p>
+        </p:txBody>
+      </p:sp>
+    </p:spTree>
+    <p:extLst>
+      <p:ext uri="{BB962C8B-B14F-4D97-AF65-F5344CB8AC3E}">
+        <p14:creationId xmlns:p14="http://schemas.microsoft.com/office/powerpoint/2010/main" val="2035253649"/>
+      </p:ext>
+    </p:extLst>
+  </p:cSld>
+  <p:clrMapOvr>
+    <a:masterClrMapping/>
+  </p:clrMapOvr>
+</p:sld>
+</file>
+
+<file path=ppt/slides/slide20.xml><?xml version="1.0" encoding="utf-8"?>
 <p:sld xmlns:a="http://schemas.openxmlformats.org/drawingml/2006/main" xmlns:r="http://schemas.openxmlformats.org/officeDocument/2006/relationships" xmlns:p="http://schemas.openxmlformats.org/presentationml/2006/main">
   <p:cSld>
     <p:spTree>
@@ -6442,7 +6848,7 @@
 </p:sld>
 </file>
 
-<file path=ppt/slides/slide19.xml><?xml version="1.0" encoding="utf-8"?>
+<file path=ppt/slides/slide21.xml><?xml version="1.0" encoding="utf-8"?>
 <p:sld xmlns:a="http://schemas.openxmlformats.org/drawingml/2006/main" xmlns:r="http://schemas.openxmlformats.org/officeDocument/2006/relationships" xmlns:p="http://schemas.openxmlformats.org/presentationml/2006/main">
   <p:cSld>
     <p:spTree>
@@ -6633,68 +7039,7 @@
 </p:sld>
 </file>
 
-<file path=ppt/slides/slide2.xml><?xml version="1.0" encoding="utf-8"?>
-<p:sld xmlns:a="http://schemas.openxmlformats.org/drawingml/2006/main" xmlns:r="http://schemas.openxmlformats.org/officeDocument/2006/relationships" xmlns:p="http://schemas.openxmlformats.org/presentationml/2006/main">
-  <p:cSld>
-    <p:spTree>
-      <p:nvGrpSpPr>
-        <p:cNvPr id="1" name=""/>
-        <p:cNvGrpSpPr/>
-        <p:nvPr/>
-      </p:nvGrpSpPr>
-      <p:grpSpPr>
-        <a:xfrm>
-          <a:off x="0" y="0"/>
-          <a:ext cx="0" cy="0"/>
-          <a:chOff x="0" y="0"/>
-          <a:chExt cx="0" cy="0"/>
-        </a:xfrm>
-      </p:grpSpPr>
-      <p:sp>
-        <p:nvSpPr>
-          <p:cNvPr id="5" name="Title 4"/>
-          <p:cNvSpPr>
-            <a:spLocks noGrp="1"/>
-          </p:cNvSpPr>
-          <p:nvPr>
-            <p:ph type="title"/>
-          </p:nvPr>
-        </p:nvSpPr>
-        <p:spPr>
-          <a:xfrm>
-            <a:off x="838200" y="2615266"/>
-            <a:ext cx="10515600" cy="1325563"/>
-          </a:xfrm>
-        </p:spPr>
-        <p:txBody>
-          <a:bodyPr>
-            <a:normAutofit/>
-          </a:bodyPr>
-          <a:lstStyle/>
-          <a:p>
-            <a:pPr algn="ctr"/>
-            <a:r>
-              <a:rPr lang="en-CA" sz="4000" dirty="0" smtClean="0"/>
-              <a:t>There are many ways to do any given task in R.</a:t>
-            </a:r>
-            <a:endParaRPr lang="en-CA" sz="4000" dirty="0"/>
-          </a:p>
-        </p:txBody>
-      </p:sp>
-    </p:spTree>
-    <p:extLst>
-      <p:ext uri="{BB962C8B-B14F-4D97-AF65-F5344CB8AC3E}">
-        <p14:creationId xmlns:p14="http://schemas.microsoft.com/office/powerpoint/2010/main" val="2035253649"/>
-      </p:ext>
-    </p:extLst>
-  </p:cSld>
-  <p:clrMapOvr>
-    <a:masterClrMapping/>
-  </p:clrMapOvr>
-</p:sld>
-</file>
-
-<file path=ppt/slides/slide20.xml><?xml version="1.0" encoding="utf-8"?>
+<file path=ppt/slides/slide22.xml><?xml version="1.0" encoding="utf-8"?>
 <p:sld xmlns:a="http://schemas.openxmlformats.org/drawingml/2006/main" xmlns:r="http://schemas.openxmlformats.org/officeDocument/2006/relationships" xmlns:p="http://schemas.openxmlformats.org/presentationml/2006/main">
   <p:cSld>
     <p:spTree>
@@ -6793,7 +7138,7 @@
 </p:sld>
 </file>
 
-<file path=ppt/slides/slide21.xml><?xml version="1.0" encoding="utf-8"?>
+<file path=ppt/slides/slide23.xml><?xml version="1.0" encoding="utf-8"?>
 <p:sld xmlns:a="http://schemas.openxmlformats.org/drawingml/2006/main" xmlns:r="http://schemas.openxmlformats.org/officeDocument/2006/relationships" xmlns:p="http://schemas.openxmlformats.org/presentationml/2006/main">
   <p:cSld>
     <p:spTree>
@@ -6862,7 +7207,15 @@
                   <a:srgbClr val="FF0000"/>
                 </a:solidFill>
               </a:rPr>
-              <a:t>non-standard evaluation</a:t>
+              <a:t>non-standard </a:t>
+            </a:r>
+            <a:r>
+              <a:rPr lang="en-CA" dirty="0" smtClean="0">
+                <a:solidFill>
+                  <a:srgbClr val="FF0000"/>
+                </a:solidFill>
+              </a:rPr>
+              <a:t>evaluation</a:t>
             </a:r>
             <a:endParaRPr lang="en-CA" dirty="0">
               <a:solidFill>
@@ -7088,7 +7441,7 @@
 </p:sld>
 </file>
 
-<file path=ppt/slides/slide22.xml><?xml version="1.0" encoding="utf-8"?>
+<file path=ppt/slides/slide24.xml><?xml version="1.0" encoding="utf-8"?>
 <p:sld xmlns:a="http://schemas.openxmlformats.org/drawingml/2006/main" xmlns:r="http://schemas.openxmlformats.org/officeDocument/2006/relationships" xmlns:p="http://schemas.openxmlformats.org/presentationml/2006/main">
   <p:cSld>
     <p:spTree>
@@ -7206,7 +7559,7 @@
 </p:sld>
 </file>
 
-<file path=ppt/slides/slide23.xml><?xml version="1.0" encoding="utf-8"?>
+<file path=ppt/slides/slide25.xml><?xml version="1.0" encoding="utf-8"?>
 <p:sld xmlns:a="http://schemas.openxmlformats.org/drawingml/2006/main" xmlns:r="http://schemas.openxmlformats.org/officeDocument/2006/relationships" xmlns:p="http://schemas.openxmlformats.org/presentationml/2006/main">
   <p:cSld>
     <p:spTree>
@@ -7259,7 +7612,7 @@
         <p:spPr/>
         <p:txBody>
           <a:bodyPr>
-            <a:normAutofit fontScale="85000" lnSpcReduction="20000"/>
+            <a:normAutofit fontScale="70000" lnSpcReduction="20000"/>
           </a:bodyPr>
           <a:lstStyle/>
           <a:p>
@@ -7318,26 +7671,53 @@
               <a:rPr lang="en-CA" dirty="0" smtClean="0">
                 <a:hlinkClick r:id="rId3"/>
               </a:rPr>
-              <a:t>https://www.rstudio.com/wp-content/uploads/2015/02/data-wrangling-cheatsheet.pdf</a:t>
-            </a:r>
-            <a:r>
-              <a:rPr lang="en-CA" dirty="0" smtClean="0"/>
-              <a:t/>
-            </a:r>
-            <a:br>
-              <a:rPr lang="en-CA" dirty="0" smtClean="0"/>
-            </a:br>
-            <a:r>
-              <a:rPr lang="en-CA" dirty="0" smtClean="0"/>
-              <a:t>for other packages: </a:t>
+              <a:t>https://</a:t>
+            </a:r>
+            <a:r>
+              <a:rPr lang="en-CA" dirty="0" smtClean="0">
+                <a:hlinkClick r:id="rId3"/>
+              </a:rPr>
+              <a:t>www.rstudio.com/wp-content/uploads/2015/02/data-wrangling-cheatsheet.pdf</a:t>
+            </a:r>
+            <a:endParaRPr lang="en-CA" dirty="0" smtClean="0"/>
+          </a:p>
+          <a:p>
+            <a:pPr marL="0" indent="0">
+              <a:buNone/>
+            </a:pPr>
+            <a:r>
+              <a:rPr lang="en-CA" dirty="0"/>
+              <a:t>O</a:t>
+            </a:r>
+            <a:r>
+              <a:rPr lang="en-CA" dirty="0" smtClean="0"/>
+              <a:t>ther </a:t>
+            </a:r>
+            <a:r>
+              <a:rPr lang="en-CA" dirty="0" err="1" smtClean="0"/>
+              <a:t>tidyverse</a:t>
+            </a:r>
+            <a:r>
+              <a:rPr lang="en-CA" dirty="0" smtClean="0"/>
+              <a:t> packages</a:t>
+            </a:r>
+            <a:r>
+              <a:rPr lang="en-CA" dirty="0" smtClean="0"/>
+              <a:t>: </a:t>
             </a:r>
             <a:r>
               <a:rPr lang="en-CA" dirty="0" smtClean="0">
                 <a:hlinkClick r:id="rId4"/>
               </a:rPr>
-              <a:t>www.rstudio.com/resources/cheatsheets/</a:t>
-            </a:r>
-            <a:endParaRPr lang="en-CA" dirty="0" smtClean="0"/>
+              <a:t>www.rstudio.com/resources/cheatsheets</a:t>
+            </a:r>
+            <a:r>
+              <a:rPr lang="en-CA" dirty="0" smtClean="0">
+                <a:hlinkClick r:id="rId4"/>
+              </a:rPr>
+              <a:t>/</a:t>
+            </a:r>
+            <a:endParaRPr lang="en-CA" dirty="0"/>
           </a:p>
           <a:p>
             <a:pPr marL="0" indent="0">
@@ -7361,7 +7741,13 @@
               <a:rPr lang="en-CA" dirty="0" smtClean="0">
                 <a:hlinkClick r:id="rId5"/>
               </a:rPr>
-              <a:t>https://r4ds.had.co.nz/</a:t>
+              <a:t>https://r4ds.had.co.nz</a:t>
+            </a:r>
+            <a:r>
+              <a:rPr lang="en-CA" dirty="0" smtClean="0">
+                <a:hlinkClick r:id="rId5"/>
+              </a:rPr>
+              <a:t>/</a:t>
             </a:r>
             <a:r>
               <a:rPr lang="en-CA" dirty="0" smtClean="0"/>
@@ -7370,6 +7756,25 @@
             <a:br>
               <a:rPr lang="en-CA" dirty="0" smtClean="0"/>
             </a:br>
+            <a:r>
+              <a:rPr lang="en-CA" dirty="0" smtClean="0"/>
+              <a:t/>
+            </a:r>
+            <a:br>
+              <a:rPr lang="en-CA" dirty="0" smtClean="0"/>
+            </a:br>
+            <a:r>
+              <a:rPr lang="en-CA" dirty="0" smtClean="0"/>
+              <a:t>base R / </a:t>
+            </a:r>
+            <a:r>
+              <a:rPr lang="en-CA" dirty="0" err="1" smtClean="0"/>
+              <a:t>tidyverse</a:t>
+            </a:r>
+            <a:r>
+              <a:rPr lang="en-CA" dirty="0" smtClean="0"/>
+              <a:t> equivalencies</a:t>
+            </a:r>
             <a:r>
               <a:rPr lang="en-CA" dirty="0"/>
               <a:t/>
@@ -7378,35 +7783,33 @@
               <a:rPr lang="en-CA" dirty="0"/>
             </a:br>
             <a:r>
-              <a:rPr lang="en-CA" dirty="0" smtClean="0"/>
-              <a:t>Help</a:t>
-            </a:r>
-            <a:br>
-              <a:rPr lang="en-CA" dirty="0" smtClean="0"/>
-            </a:br>
+              <a:rPr lang="en-CA" dirty="0">
+                <a:hlinkClick r:id="rId6"/>
+              </a:rPr>
+              <a:t>www.significantdigits.org/2017/10/switching-from-base-r-to-tidyverse</a:t>
+            </a:r>
             <a:r>
               <a:rPr lang="en-CA" dirty="0" smtClean="0">
                 <a:hlinkClick r:id="rId6"/>
               </a:rPr>
-              <a:t>https://stackoverflow.com/</a:t>
-            </a:r>
-            <a:r>
-              <a:rPr lang="en-CA" dirty="0" smtClean="0"/>
+              <a:t>/</a:t>
+            </a:r>
+            <a:endParaRPr lang="en-CA" dirty="0" smtClean="0"/>
+          </a:p>
+          <a:p>
+            <a:pPr marL="0" indent="0">
+              <a:buNone/>
+            </a:pPr>
+            <a:r>
+              <a:rPr lang="en-CA" sz="2900" dirty="0"/>
               <a:t/>
             </a:r>
             <a:br>
-              <a:rPr lang="en-CA" dirty="0" smtClean="0"/>
+              <a:rPr lang="en-CA" sz="2900" dirty="0"/>
             </a:br>
             <a:r>
               <a:rPr lang="en-CA" dirty="0" smtClean="0"/>
-              <a:t/>
-            </a:r>
-            <a:br>
-              <a:rPr lang="en-CA" dirty="0" smtClean="0"/>
-            </a:br>
-            <a:r>
-              <a:rPr lang="en-CA" dirty="0" smtClean="0"/>
-              <a:t>Source code</a:t>
+              <a:t>Help</a:t>
             </a:r>
             <a:br>
               <a:rPr lang="en-CA" dirty="0" smtClean="0"/>
@@ -7414,6 +7817,33 @@
             <a:r>
               <a:rPr lang="en-CA" dirty="0" smtClean="0">
                 <a:hlinkClick r:id="rId7"/>
+              </a:rPr>
+              <a:t>https://stackoverflow.com/</a:t>
+            </a:r>
+            <a:r>
+              <a:rPr lang="en-CA" dirty="0" smtClean="0"/>
+              <a:t/>
+            </a:r>
+            <a:br>
+              <a:rPr lang="en-CA" dirty="0" smtClean="0"/>
+            </a:br>
+            <a:r>
+              <a:rPr lang="en-CA" dirty="0" smtClean="0"/>
+              <a:t/>
+            </a:r>
+            <a:br>
+              <a:rPr lang="en-CA" dirty="0" smtClean="0"/>
+            </a:br>
+            <a:r>
+              <a:rPr lang="en-CA" dirty="0" smtClean="0"/>
+              <a:t>Source code</a:t>
+            </a:r>
+            <a:br>
+              <a:rPr lang="en-CA" dirty="0" smtClean="0"/>
+            </a:br>
+            <a:r>
+              <a:rPr lang="en-CA" dirty="0" smtClean="0">
+                <a:hlinkClick r:id="rId8"/>
               </a:rPr>
               <a:t>https://github.com/tidyverse/tidyverse</a:t>
             </a:r>
@@ -7754,7 +8184,7 @@
           <a:effectLst/>
           <a:extLst>
             <a:ext uri="{91240B29-F687-4f45-9708-019B960494DF}">
-              <a14:hiddenLine xmlns:a14="http://schemas.microsoft.com/office/drawing/2010/main" w="9525">
+              <a14:hiddenLine xmlns:a14="http://schemas.microsoft.com/office/drawing/2010/main" xmlns="" w="9525">
                 <a:solidFill>
                   <a:schemeClr val="tx1"/>
                 </a:solidFill>
@@ -7764,7 +8194,7 @@
               </a14:hiddenLine>
             </a:ext>
             <a:ext uri="{AF507438-7753-43e0-B8FC-AC1667EBCBE1}">
-              <a14:hiddenEffects xmlns:a14="http://schemas.microsoft.com/office/drawing/2010/main">
+              <a14:hiddenEffects xmlns:a14="http://schemas.microsoft.com/office/drawing/2010/main" xmlns="">
                 <a:effectLst>
                   <a:outerShdw dist="35921" dir="2700000" algn="ctr" rotWithShape="0">
                     <a:schemeClr val="bg2"/>
@@ -8512,7 +8942,7 @@
             </a:pPr>
             <a:r>
               <a:rPr lang="en-CA" dirty="0" smtClean="0"/>
-              <a:t>thatData3 </a:t>
+              <a:t>thatData3[] </a:t>
             </a:r>
             <a:r>
               <a:rPr lang="en-CA" dirty="0"/>
@@ -8529,7 +8959,7 @@
             </a:pPr>
             <a:r>
               <a:rPr lang="en-CA" dirty="0" smtClean="0"/>
-              <a:t>thatData3 </a:t>
+              <a:t>thatData3[] </a:t>
             </a:r>
             <a:r>
               <a:rPr lang="en-CA" dirty="0"/>
@@ -9029,7 +9459,7 @@
             </a:pPr>
             <a:r>
               <a:rPr lang="en-CA" dirty="0" smtClean="0"/>
-              <a:t>thatData3 </a:t>
+              <a:t>thatData3[] </a:t>
             </a:r>
             <a:r>
               <a:rPr lang="en-CA" dirty="0"/>
@@ -9046,7 +9476,7 @@
             </a:pPr>
             <a:r>
               <a:rPr lang="en-CA" dirty="0" smtClean="0"/>
-              <a:t>thatData3 </a:t>
+              <a:t>thatData3[] </a:t>
             </a:r>
             <a:r>
               <a:rPr lang="en-CA" dirty="0"/>
@@ -9373,7 +9803,7 @@
   <a:extraClrSchemeLst/>
   <a:extLst>
     <a:ext uri="{05A4C25C-085E-4340-85A3-A5531E510DB2}">
-      <thm15:themeFamily xmlns:thm15="http://schemas.microsoft.com/office/thememl/2012/main" xmlns="" name="Office Theme" id="{62F939B6-93AF-4DB8-9C6B-D6C7DFDC589F}" vid="{4A3C46E8-61CC-4603-A589-7422A47A8E4A}"/>
+      <thm15:themeFamily xmlns:thm15="http://schemas.microsoft.com/office/thememl/2012/main" name="Office Theme" id="{62F939B6-93AF-4DB8-9C6B-D6C7DFDC589F}" vid="{4A3C46E8-61CC-4603-A589-7422A47A8E4A}"/>
     </a:ext>
   </a:extLst>
 </a:theme>

</xml_diff>

<commit_message>
minor change to .ppt
</commit_message>
<xml_diff>
--- a/tidyverse.pptx
+++ b/tidyverse.pptx
@@ -1045,6 +1045,90 @@
     <p:extLst>
       <p:ext uri="{BB962C8B-B14F-4D97-AF65-F5344CB8AC3E}">
         <p14:creationId xmlns:p14="http://schemas.microsoft.com/office/powerpoint/2010/main" val="1233599517"/>
+      </p:ext>
+    </p:extLst>
+  </p:cSld>
+  <p:clrMapOvr>
+    <a:masterClrMapping/>
+  </p:clrMapOvr>
+</p:notes>
+</file>
+
+<file path=ppt/notesSlides/notesSlide6.xml><?xml version="1.0" encoding="utf-8"?>
+<p:notes xmlns:a="http://schemas.openxmlformats.org/drawingml/2006/main" xmlns:r="http://schemas.openxmlformats.org/officeDocument/2006/relationships" xmlns:p="http://schemas.openxmlformats.org/presentationml/2006/main">
+  <p:cSld>
+    <p:spTree>
+      <p:nvGrpSpPr>
+        <p:cNvPr id="1" name=""/>
+        <p:cNvGrpSpPr/>
+        <p:nvPr/>
+      </p:nvGrpSpPr>
+      <p:grpSpPr>
+        <a:xfrm>
+          <a:off x="0" y="0"/>
+          <a:ext cx="0" cy="0"/>
+          <a:chOff x="0" y="0"/>
+          <a:chExt cx="0" cy="0"/>
+        </a:xfrm>
+      </p:grpSpPr>
+      <p:sp>
+        <p:nvSpPr>
+          <p:cNvPr id="2" name="Slide Image Placeholder 1"/>
+          <p:cNvSpPr>
+            <a:spLocks noGrp="1" noRot="1" noChangeAspect="1"/>
+          </p:cNvSpPr>
+          <p:nvPr>
+            <p:ph type="sldImg"/>
+          </p:nvPr>
+        </p:nvSpPr>
+        <p:spPr/>
+      </p:sp>
+      <p:sp>
+        <p:nvSpPr>
+          <p:cNvPr id="3" name="Notes Placeholder 2"/>
+          <p:cNvSpPr>
+            <a:spLocks noGrp="1"/>
+          </p:cNvSpPr>
+          <p:nvPr>
+            <p:ph type="body" idx="1"/>
+          </p:nvPr>
+        </p:nvSpPr>
+        <p:spPr/>
+        <p:txBody>
+          <a:bodyPr/>
+          <a:lstStyle/>
+          <a:p>
+            <a:endParaRPr lang="en-CA" dirty="0"/>
+          </a:p>
+        </p:txBody>
+      </p:sp>
+      <p:sp>
+        <p:nvSpPr>
+          <p:cNvPr id="4" name="Slide Number Placeholder 3"/>
+          <p:cNvSpPr>
+            <a:spLocks noGrp="1"/>
+          </p:cNvSpPr>
+          <p:nvPr>
+            <p:ph type="sldNum" sz="quarter" idx="10"/>
+          </p:nvPr>
+        </p:nvSpPr>
+        <p:spPr/>
+        <p:txBody>
+          <a:bodyPr/>
+          <a:lstStyle/>
+          <a:p>
+            <a:fld id="{F0DF66E8-9777-DD40-AF28-F574EDC2F055}" type="slidenum">
+              <a:rPr lang="en-US" smtClean="0"/>
+              <a:t>19</a:t>
+            </a:fld>
+            <a:endParaRPr lang="en-US"/>
+          </a:p>
+        </p:txBody>
+      </p:sp>
+    </p:spTree>
+    <p:extLst>
+      <p:ext uri="{BB962C8B-B14F-4D97-AF65-F5344CB8AC3E}">
+        <p14:creationId xmlns:p14="http://schemas.microsoft.com/office/powerpoint/2010/main" val="710882013"/>
       </p:ext>
     </p:extLst>
   </p:cSld>
@@ -3927,10 +4011,25 @@
           <a:lstStyle/>
           <a:p>
             <a:r>
+              <a:rPr lang="en-CA" dirty="0" err="1"/>
+              <a:t>t</a:t>
+            </a:r>
+            <a:r>
               <a:rPr lang="en-CA" dirty="0" err="1" smtClean="0"/>
-              <a:t>tidyverse</a:t>
-            </a:r>
-            <a:endParaRPr lang="en-CA" dirty="0"/>
+              <a:t>idyverse</a:t>
+            </a:r>
+            <a:r>
+              <a:rPr lang="en-CA" dirty="0" smtClean="0"/>
+              <a:t/>
+            </a:r>
+            <a:br>
+              <a:rPr lang="en-CA" dirty="0" smtClean="0"/>
+            </a:br>
+            <a:r>
+              <a:rPr lang="en-CA" sz="2800" dirty="0" smtClean="0"/>
+              <a:t>tidyverse.org</a:t>
+            </a:r>
+            <a:endParaRPr lang="en-CA" sz="2800" dirty="0"/>
           </a:p>
         </p:txBody>
       </p:sp>
@@ -3946,20 +4045,42 @@
         </p:nvSpPr>
         <p:spPr>
           <a:xfrm>
-            <a:off x="1524000" y="3754443"/>
-            <a:ext cx="9144000" cy="1655762"/>
+            <a:off x="1524000" y="3754442"/>
+            <a:ext cx="9144000" cy="2164577"/>
           </a:xfrm>
         </p:spPr>
         <p:txBody>
           <a:bodyPr>
-            <a:normAutofit/>
+            <a:normAutofit fontScale="77500" lnSpcReduction="20000"/>
           </a:bodyPr>
           <a:lstStyle/>
           <a:p>
+            <a:endParaRPr lang="en-CA" sz="3200" dirty="0"/>
+          </a:p>
+          <a:p>
             <a:r>
               <a:rPr lang="en-CA" sz="3200" dirty="0" smtClean="0"/>
-              <a:t>www.tidyverse.org</a:t>
-            </a:r>
+              <a:t>Colette Ward</a:t>
+            </a:r>
+          </a:p>
+          <a:p>
+            <a:r>
+              <a:rPr lang="en-CA" sz="3200" dirty="0" smtClean="0"/>
+              <a:t>24 January 2018</a:t>
+            </a:r>
+          </a:p>
+          <a:p>
+            <a:r>
+              <a:rPr lang="en-CA" sz="3200" dirty="0"/>
+              <a:t>Materials available here: https://github.com/clward/tidyverseIntro</a:t>
+            </a:r>
+            <a:r>
+              <a:rPr lang="en-CA" sz="3200" dirty="0" smtClean="0"/>
+              <a:t/>
+            </a:r>
+            <a:br>
+              <a:rPr lang="en-CA" sz="3200" dirty="0" smtClean="0"/>
+            </a:br>
             <a:endParaRPr lang="en-CA" sz="3200" dirty="0"/>
           </a:p>
         </p:txBody>
@@ -3974,6 +4095,13 @@
   <p:clrMapOvr>
     <a:masterClrMapping/>
   </p:clrMapOvr>
+  <p:timing>
+    <p:tnLst>
+      <p:par>
+        <p:cTn id="1" dur="indefinite" restart="never" nodeType="tmRoot"/>
+      </p:par>
+    </p:tnLst>
+  </p:timing>
 </p:sld>
 </file>
 
@@ -4272,6 +4400,13 @@
   <p:clrMapOvr>
     <a:masterClrMapping/>
   </p:clrMapOvr>
+  <p:timing>
+    <p:tnLst>
+      <p:par>
+        <p:cTn id="1" dur="indefinite" restart="never" nodeType="tmRoot"/>
+      </p:par>
+    </p:tnLst>
+  </p:timing>
 </p:sld>
 </file>
 
@@ -4714,6 +4849,13 @@
   <p:clrMapOvr>
     <a:masterClrMapping/>
   </p:clrMapOvr>
+  <p:timing>
+    <p:tnLst>
+      <p:par>
+        <p:cTn id="1" dur="indefinite" restart="never" nodeType="tmRoot"/>
+      </p:par>
+    </p:tnLst>
+  </p:timing>
 </p:sld>
 </file>
 
@@ -5236,6 +5378,13 @@
   <p:clrMapOvr>
     <a:masterClrMapping/>
   </p:clrMapOvr>
+  <p:timing>
+    <p:tnLst>
+      <p:par>
+        <p:cTn id="1" dur="indefinite" restart="never" nodeType="tmRoot"/>
+      </p:par>
+    </p:tnLst>
+  </p:timing>
 </p:sld>
 </file>
 
@@ -5349,6 +5498,45 @@
           </a:prstGeom>
         </p:spPr>
       </p:pic>
+      <p:sp>
+        <p:nvSpPr>
+          <p:cNvPr id="4" name="TextBox 3"/>
+          <p:cNvSpPr txBox="1"/>
+          <p:nvPr/>
+        </p:nvSpPr>
+        <p:spPr>
+          <a:xfrm>
+            <a:off x="3426542" y="4159046"/>
+            <a:ext cx="5338916" cy="1107996"/>
+          </a:xfrm>
+          <a:prstGeom prst="rect">
+            <a:avLst/>
+          </a:prstGeom>
+          <a:noFill/>
+        </p:spPr>
+        <p:txBody>
+          <a:bodyPr wrap="square" rtlCol="0">
+            <a:spAutoFit/>
+          </a:bodyPr>
+          <a:lstStyle/>
+          <a:p>
+            <a:pPr algn="ctr"/>
+            <a:r>
+              <a:rPr lang="en-CA" sz="6600" b="1" dirty="0" smtClean="0">
+                <a:solidFill>
+                  <a:srgbClr val="FF0000"/>
+                </a:solidFill>
+              </a:rPr>
+              <a:t>Not tidy!</a:t>
+            </a:r>
+            <a:endParaRPr lang="en-CA" sz="6600" b="1" dirty="0">
+              <a:solidFill>
+                <a:srgbClr val="FF0000"/>
+              </a:solidFill>
+            </a:endParaRPr>
+          </a:p>
+        </p:txBody>
+      </p:sp>
     </p:spTree>
     <p:extLst>
       <p:ext uri="{BB962C8B-B14F-4D97-AF65-F5344CB8AC3E}">
@@ -5359,6 +5547,13 @@
   <p:clrMapOvr>
     <a:masterClrMapping/>
   </p:clrMapOvr>
+  <p:timing>
+    <p:tnLst>
+      <p:par>
+        <p:cTn id="1" dur="indefinite" restart="never" nodeType="tmRoot"/>
+      </p:par>
+    </p:tnLst>
+  </p:timing>
 </p:sld>
 </file>
 
@@ -5478,6 +5673,54 @@
           </a:prstGeom>
         </p:spPr>
       </p:pic>
+      <p:sp>
+        <p:nvSpPr>
+          <p:cNvPr id="5" name="TextBox 4"/>
+          <p:cNvSpPr txBox="1"/>
+          <p:nvPr/>
+        </p:nvSpPr>
+        <p:spPr>
+          <a:xfrm>
+            <a:off x="3426542" y="4159046"/>
+            <a:ext cx="5338916" cy="1107996"/>
+          </a:xfrm>
+          <a:prstGeom prst="rect">
+            <a:avLst/>
+          </a:prstGeom>
+          <a:noFill/>
+        </p:spPr>
+        <p:txBody>
+          <a:bodyPr wrap="square" rtlCol="0">
+            <a:spAutoFit/>
+          </a:bodyPr>
+          <a:lstStyle/>
+          <a:p>
+            <a:pPr algn="ctr"/>
+            <a:r>
+              <a:rPr lang="en-CA" sz="6600" b="1" dirty="0" smtClean="0">
+                <a:solidFill>
+                  <a:srgbClr val="FF0000"/>
+                </a:solidFill>
+              </a:rPr>
+              <a:t>Tidy </a:t>
+            </a:r>
+            <a:r>
+              <a:rPr lang="en-CA" sz="6600" b="1" dirty="0" smtClean="0">
+                <a:solidFill>
+                  <a:srgbClr val="FF0000"/>
+                </a:solidFill>
+                <a:sym typeface="Wingdings" panose="05000000000000000000" pitchFamily="2" charset="2"/>
+              </a:rPr>
+              <a:t></a:t>
+            </a:r>
+            <a:endParaRPr lang="en-CA" sz="6600" b="1" dirty="0">
+              <a:solidFill>
+                <a:srgbClr val="FF0000"/>
+              </a:solidFill>
+            </a:endParaRPr>
+          </a:p>
+        </p:txBody>
+      </p:sp>
     </p:spTree>
     <p:extLst>
       <p:ext uri="{BB962C8B-B14F-4D97-AF65-F5344CB8AC3E}">
@@ -5488,6 +5731,13 @@
   <p:clrMapOvr>
     <a:masterClrMapping/>
   </p:clrMapOvr>
+  <p:timing>
+    <p:tnLst>
+      <p:par>
+        <p:cTn id="1" dur="indefinite" restart="never" nodeType="tmRoot"/>
+      </p:par>
+    </p:tnLst>
+  </p:timing>
 </p:sld>
 </file>
 
@@ -5662,6 +5912,13 @@
   <p:clrMapOvr>
     <a:masterClrMapping/>
   </p:clrMapOvr>
+  <p:timing>
+    <p:tnLst>
+      <p:par>
+        <p:cTn id="1" dur="indefinite" restart="never" nodeType="tmRoot"/>
+      </p:par>
+    </p:tnLst>
+  </p:timing>
 </p:sld>
 </file>
 
@@ -5833,6 +6090,13 @@
   <p:clrMapOvr>
     <a:masterClrMapping/>
   </p:clrMapOvr>
+  <p:timing>
+    <p:tnLst>
+      <p:par>
+        <p:cTn id="1" dur="indefinite" restart="never" nodeType="tmRoot"/>
+      </p:par>
+    </p:tnLst>
+  </p:timing>
 </p:sld>
 </file>
 
@@ -6268,6 +6532,13 @@
   <p:clrMapOvr>
     <a:masterClrMapping/>
   </p:clrMapOvr>
+  <p:timing>
+    <p:tnLst>
+      <p:par>
+        <p:cTn id="1" dur="indefinite" restart="never" nodeType="tmRoot"/>
+      </p:par>
+    </p:tnLst>
+  </p:timing>
 </p:sld>
 </file>
 
@@ -6452,6 +6723,13 @@
   <p:clrMapOvr>
     <a:masterClrMapping/>
   </p:clrMapOvr>
+  <p:timing>
+    <p:tnLst>
+      <p:par>
+        <p:cTn id="1" dur="indefinite" restart="never" nodeType="tmRoot"/>
+      </p:par>
+    </p:tnLst>
+  </p:timing>
 </p:sld>
 </file>
 
@@ -6569,11 +6847,7 @@
             </a:pPr>
             <a:r>
               <a:rPr lang="en-CA" dirty="0" smtClean="0"/>
-              <a:t>Collapse </a:t>
-            </a:r>
-            <a:r>
-              <a:rPr lang="en-CA" dirty="0" smtClean="0"/>
-              <a:t>multiple values into a single value: </a:t>
+              <a:t>Collapse multiple values into a single value: </a:t>
             </a:r>
             <a:br>
               <a:rPr lang="en-CA" dirty="0" smtClean="0"/>
@@ -6685,6 +6959,13 @@
   <p:clrMapOvr>
     <a:masterClrMapping/>
   </p:clrMapOvr>
+  <p:timing>
+    <p:tnLst>
+      <p:par>
+        <p:cTn id="1" dur="indefinite" restart="never" nodeType="tmRoot"/>
+      </p:par>
+    </p:tnLst>
+  </p:timing>
 </p:sld>
 </file>
 
@@ -7207,15 +7488,7 @@
                   <a:srgbClr val="FF0000"/>
                 </a:solidFill>
               </a:rPr>
-              <a:t>non-standard </a:t>
-            </a:r>
-            <a:r>
-              <a:rPr lang="en-CA" dirty="0" smtClean="0">
-                <a:solidFill>
-                  <a:srgbClr val="FF0000"/>
-                </a:solidFill>
-              </a:rPr>
-              <a:t>evaluation</a:t>
+              <a:t>non-standard evaluation</a:t>
             </a:r>
             <a:endParaRPr lang="en-CA" dirty="0">
               <a:solidFill>
@@ -7671,13 +7944,7 @@
               <a:rPr lang="en-CA" dirty="0" smtClean="0">
                 <a:hlinkClick r:id="rId3"/>
               </a:rPr>
-              <a:t>https://</a:t>
-            </a:r>
-            <a:r>
-              <a:rPr lang="en-CA" dirty="0" smtClean="0">
-                <a:hlinkClick r:id="rId3"/>
-              </a:rPr>
-              <a:t>www.rstudio.com/wp-content/uploads/2015/02/data-wrangling-cheatsheet.pdf</a:t>
+              <a:t>https://www.rstudio.com/wp-content/uploads/2015/02/data-wrangling-cheatsheet.pdf</a:t>
             </a:r>
             <a:endParaRPr lang="en-CA" dirty="0" smtClean="0"/>
           </a:p>
@@ -7699,23 +7966,13 @@
             </a:r>
             <a:r>
               <a:rPr lang="en-CA" dirty="0" smtClean="0"/>
-              <a:t> packages</a:t>
-            </a:r>
-            <a:r>
-              <a:rPr lang="en-CA" dirty="0" smtClean="0"/>
-              <a:t>: </a:t>
+              <a:t> packages: </a:t>
             </a:r>
             <a:r>
               <a:rPr lang="en-CA" dirty="0" smtClean="0">
                 <a:hlinkClick r:id="rId4"/>
               </a:rPr>
-              <a:t>www.rstudio.com/resources/cheatsheets</a:t>
-            </a:r>
-            <a:r>
-              <a:rPr lang="en-CA" dirty="0" smtClean="0">
-                <a:hlinkClick r:id="rId4"/>
-              </a:rPr>
-              <a:t>/</a:t>
+              <a:t>www.rstudio.com/resources/cheatsheets/</a:t>
             </a:r>
             <a:endParaRPr lang="en-CA" dirty="0"/>
           </a:p>
@@ -7741,13 +7998,7 @@
               <a:rPr lang="en-CA" dirty="0" smtClean="0">
                 <a:hlinkClick r:id="rId5"/>
               </a:rPr>
-              <a:t>https://r4ds.had.co.nz</a:t>
-            </a:r>
-            <a:r>
-              <a:rPr lang="en-CA" dirty="0" smtClean="0">
-                <a:hlinkClick r:id="rId5"/>
-              </a:rPr>
-              <a:t>/</a:t>
+              <a:t>https://r4ds.had.co.nz/</a:t>
             </a:r>
             <a:r>
               <a:rPr lang="en-CA" dirty="0" smtClean="0"/>
@@ -7948,6 +8199,13 @@
   <p:clrMapOvr>
     <a:masterClrMapping/>
   </p:clrMapOvr>
+  <p:timing>
+    <p:tnLst>
+      <p:par>
+        <p:cTn id="1" dur="indefinite" restart="never" nodeType="tmRoot"/>
+      </p:par>
+    </p:tnLst>
+  </p:timing>
 </p:sld>
 </file>
 
@@ -8300,6 +8558,13 @@
   <p:clrMapOvr>
     <a:masterClrMapping/>
   </p:clrMapOvr>
+  <p:timing>
+    <p:tnLst>
+      <p:par>
+        <p:cTn id="1" dur="indefinite" restart="never" nodeType="tmRoot"/>
+      </p:par>
+    </p:tnLst>
+  </p:timing>
 </p:sld>
 </file>
 
@@ -8456,6 +8721,13 @@
   <p:clrMapOvr>
     <a:masterClrMapping/>
   </p:clrMapOvr>
+  <p:timing>
+    <p:tnLst>
+      <p:par>
+        <p:cTn id="1" dur="indefinite" restart="never" nodeType="tmRoot"/>
+      </p:par>
+    </p:tnLst>
+  </p:timing>
 </p:sld>
 </file>
 
@@ -8533,6 +8805,13 @@
   <p:clrMapOvr>
     <a:masterClrMapping/>
   </p:clrMapOvr>
+  <p:timing>
+    <p:tnLst>
+      <p:par>
+        <p:cTn id="1" dur="indefinite" restart="never" nodeType="tmRoot"/>
+      </p:par>
+    </p:tnLst>
+  </p:timing>
 </p:sld>
 </file>
 
@@ -8602,6 +8881,13 @@
   <p:clrMapOvr>
     <a:masterClrMapping/>
   </p:clrMapOvr>
+  <p:timing>
+    <p:tnLst>
+      <p:par>
+        <p:cTn id="1" dur="indefinite" restart="never" nodeType="tmRoot"/>
+      </p:par>
+    </p:tnLst>
+  </p:timing>
 </p:sld>
 </file>
 
@@ -8988,6 +9274,13 @@
   <p:clrMapOvr>
     <a:masterClrMapping/>
   </p:clrMapOvr>
+  <p:timing>
+    <p:tnLst>
+      <p:par>
+        <p:cTn id="1" dur="indefinite" restart="never" nodeType="tmRoot"/>
+      </p:par>
+    </p:tnLst>
+  </p:timing>
 </p:sld>
 </file>
 
@@ -9545,6 +9838,13 @@
   <p:clrMapOvr>
     <a:masterClrMapping/>
   </p:clrMapOvr>
+  <p:timing>
+    <p:tnLst>
+      <p:par>
+        <p:cTn id="1" dur="indefinite" restart="never" nodeType="tmRoot"/>
+      </p:par>
+    </p:tnLst>
+  </p:timing>
 </p:sld>
 </file>
 

</xml_diff>